<commit_message>
update cp2.1 and 2.2
</commit_message>
<xml_diff>
--- a/FiguresPaper.pptx
+++ b/FiguresPaper.pptx
@@ -5,10 +5,12 @@
     <p:sldMasterId id="2147483648" r:id="rId1"/>
   </p:sldMasterIdLst>
   <p:notesMasterIdLst>
-    <p:notesMasterId r:id="rId3"/>
+    <p:notesMasterId r:id="rId5"/>
   </p:notesMasterIdLst>
   <p:sldIdLst>
-    <p:sldId id="298" r:id="rId2"/>
+    <p:sldId id="299" r:id="rId2"/>
+    <p:sldId id="300" r:id="rId3"/>
+    <p:sldId id="298" r:id="rId4"/>
   </p:sldIdLst>
   <p:sldSz cx="9144000" cy="6858000" type="screen4x3"/>
   <p:notesSz cx="6858000" cy="9144000"/>
@@ -208,7 +210,7 @@
           <a:p>
             <a:fld id="{F28D62E0-191E-42FF-A98D-D06FD014851B}" type="datetimeFigureOut">
               <a:rPr lang="en-AU" smtClean="0"/>
-              <a:t>6/7/17</a:t>
+              <a:t>7/7/17</a:t>
             </a:fld>
             <a:endParaRPr lang="en-AU"/>
           </a:p>
@@ -657,7 +659,7 @@
           <a:p>
             <a:fld id="{D4351B45-279F-42A8-9B05-CE858E05D9F5}" type="datetimeFigureOut">
               <a:rPr lang="en-NZ" smtClean="0"/>
-              <a:t>6/07/17</a:t>
+              <a:t>7/07/17</a:t>
             </a:fld>
             <a:endParaRPr lang="en-NZ"/>
           </a:p>
@@ -827,7 +829,7 @@
           <a:p>
             <a:fld id="{D4351B45-279F-42A8-9B05-CE858E05D9F5}" type="datetimeFigureOut">
               <a:rPr lang="en-NZ" smtClean="0"/>
-              <a:t>6/07/17</a:t>
+              <a:t>7/07/17</a:t>
             </a:fld>
             <a:endParaRPr lang="en-NZ"/>
           </a:p>
@@ -1007,7 +1009,7 @@
           <a:p>
             <a:fld id="{D4351B45-279F-42A8-9B05-CE858E05D9F5}" type="datetimeFigureOut">
               <a:rPr lang="en-NZ" smtClean="0"/>
-              <a:t>6/07/17</a:t>
+              <a:t>7/07/17</a:t>
             </a:fld>
             <a:endParaRPr lang="en-NZ"/>
           </a:p>
@@ -1177,7 +1179,7 @@
           <a:p>
             <a:fld id="{D4351B45-279F-42A8-9B05-CE858E05D9F5}" type="datetimeFigureOut">
               <a:rPr lang="en-NZ" smtClean="0"/>
-              <a:t>6/07/17</a:t>
+              <a:t>7/07/17</a:t>
             </a:fld>
             <a:endParaRPr lang="en-NZ"/>
           </a:p>
@@ -1423,7 +1425,7 @@
           <a:p>
             <a:fld id="{D4351B45-279F-42A8-9B05-CE858E05D9F5}" type="datetimeFigureOut">
               <a:rPr lang="en-NZ" smtClean="0"/>
-              <a:t>6/07/17</a:t>
+              <a:t>7/07/17</a:t>
             </a:fld>
             <a:endParaRPr lang="en-NZ"/>
           </a:p>
@@ -1711,7 +1713,7 @@
           <a:p>
             <a:fld id="{D4351B45-279F-42A8-9B05-CE858E05D9F5}" type="datetimeFigureOut">
               <a:rPr lang="en-NZ" smtClean="0"/>
-              <a:t>6/07/17</a:t>
+              <a:t>7/07/17</a:t>
             </a:fld>
             <a:endParaRPr lang="en-NZ"/>
           </a:p>
@@ -2133,7 +2135,7 @@
           <a:p>
             <a:fld id="{D4351B45-279F-42A8-9B05-CE858E05D9F5}" type="datetimeFigureOut">
               <a:rPr lang="en-NZ" smtClean="0"/>
-              <a:t>6/07/17</a:t>
+              <a:t>7/07/17</a:t>
             </a:fld>
             <a:endParaRPr lang="en-NZ"/>
           </a:p>
@@ -2251,7 +2253,7 @@
           <a:p>
             <a:fld id="{D4351B45-279F-42A8-9B05-CE858E05D9F5}" type="datetimeFigureOut">
               <a:rPr lang="en-NZ" smtClean="0"/>
-              <a:t>6/07/17</a:t>
+              <a:t>7/07/17</a:t>
             </a:fld>
             <a:endParaRPr lang="en-NZ"/>
           </a:p>
@@ -2346,7 +2348,7 @@
           <a:p>
             <a:fld id="{D4351B45-279F-42A8-9B05-CE858E05D9F5}" type="datetimeFigureOut">
               <a:rPr lang="en-NZ" smtClean="0"/>
-              <a:t>6/07/17</a:t>
+              <a:t>7/07/17</a:t>
             </a:fld>
             <a:endParaRPr lang="en-NZ"/>
           </a:p>
@@ -2623,7 +2625,7 @@
           <a:p>
             <a:fld id="{D4351B45-279F-42A8-9B05-CE858E05D9F5}" type="datetimeFigureOut">
               <a:rPr lang="en-NZ" smtClean="0"/>
-              <a:t>6/07/17</a:t>
+              <a:t>7/07/17</a:t>
             </a:fld>
             <a:endParaRPr lang="en-NZ"/>
           </a:p>
@@ -2876,7 +2878,7 @@
           <a:p>
             <a:fld id="{D4351B45-279F-42A8-9B05-CE858E05D9F5}" type="datetimeFigureOut">
               <a:rPr lang="en-NZ" smtClean="0"/>
-              <a:t>6/07/17</a:t>
+              <a:t>7/07/17</a:t>
             </a:fld>
             <a:endParaRPr lang="en-NZ"/>
           </a:p>
@@ -3089,7 +3091,7 @@
           <a:p>
             <a:fld id="{D4351B45-279F-42A8-9B05-CE858E05D9F5}" type="datetimeFigureOut">
               <a:rPr lang="en-NZ" smtClean="0"/>
-              <a:t>6/07/17</a:t>
+              <a:t>7/07/17</a:t>
             </a:fld>
             <a:endParaRPr lang="en-NZ"/>
           </a:p>
@@ -3448,6 +3450,1542 @@
 </file>
 
 <file path=ppt/slides/slide1.xml><?xml version="1.0" encoding="utf-8"?>
+<p:sld xmlns:a="http://schemas.openxmlformats.org/drawingml/2006/main" xmlns:r="http://schemas.openxmlformats.org/officeDocument/2006/relationships" xmlns:p="http://schemas.openxmlformats.org/presentationml/2006/main">
+  <p:cSld>
+    <p:spTree>
+      <p:nvGrpSpPr>
+        <p:cNvPr id="1" name=""/>
+        <p:cNvGrpSpPr/>
+        <p:nvPr/>
+      </p:nvGrpSpPr>
+      <p:grpSpPr>
+        <a:xfrm>
+          <a:off x="0" y="0"/>
+          <a:ext cx="0" cy="0"/>
+          <a:chOff x="0" y="0"/>
+          <a:chExt cx="0" cy="0"/>
+        </a:xfrm>
+      </p:grpSpPr>
+      <mc:AlternateContent xmlns:mc="http://schemas.openxmlformats.org/markup-compatibility/2006">
+        <mc:Choice xmlns:a14="http://schemas.microsoft.com/office/drawing/2010/main" Requires="a14">
+          <p:sp>
+            <p:nvSpPr>
+              <p:cNvPr id="4" name="Oval 3"/>
+              <p:cNvSpPr/>
+              <p:nvPr/>
+            </p:nvSpPr>
+            <p:spPr>
+              <a:xfrm>
+                <a:off x="2051720" y="1565176"/>
+                <a:ext cx="792088" cy="792088"/>
+              </a:xfrm>
+              <a:prstGeom prst="ellipse">
+                <a:avLst/>
+              </a:prstGeom>
+              <a:noFill/>
+              <a:ln>
+                <a:solidFill>
+                  <a:schemeClr val="tx1"/>
+                </a:solidFill>
+              </a:ln>
+            </p:spPr>
+            <p:style>
+              <a:lnRef idx="2">
+                <a:schemeClr val="accent1">
+                  <a:shade val="50000"/>
+                </a:schemeClr>
+              </a:lnRef>
+              <a:fillRef idx="1">
+                <a:schemeClr val="accent1"/>
+              </a:fillRef>
+              <a:effectRef idx="0">
+                <a:schemeClr val="accent1"/>
+              </a:effectRef>
+              <a:fontRef idx="minor">
+                <a:schemeClr val="lt1"/>
+              </a:fontRef>
+            </p:style>
+            <p:txBody>
+              <a:bodyPr rtlCol="0" anchor="ctr"/>
+              <a:lstStyle/>
+              <a:p>
+                <a:pPr algn="ctr"/>
+                <a14:m>
+                  <m:oMathPara xmlns:m="http://schemas.openxmlformats.org/officeDocument/2006/math">
+                    <m:oMathParaPr>
+                      <m:jc m:val="centerGroup"/>
+                    </m:oMathParaPr>
+                    <m:oMath xmlns:m="http://schemas.openxmlformats.org/officeDocument/2006/math">
+                      <m:sSub>
+                        <m:sSubPr>
+                          <m:ctrlPr>
+                            <a:rPr lang="en-US" i="1" dirty="0" smtClean="0">
+                              <a:solidFill>
+                                <a:schemeClr val="tx1"/>
+                              </a:solidFill>
+                              <a:latin typeface="Cambria Math" charset="0"/>
+                            </a:rPr>
+                          </m:ctrlPr>
+                        </m:sSubPr>
+                        <m:e>
+                          <m:r>
+                            <a:rPr lang="en-AU" b="0" i="1" dirty="0" smtClean="0">
+                              <a:solidFill>
+                                <a:schemeClr val="tx1"/>
+                              </a:solidFill>
+                              <a:latin typeface="Cambria Math" charset="0"/>
+                            </a:rPr>
+                            <m:t>𝑆</m:t>
+                          </m:r>
+                        </m:e>
+                        <m:sub>
+                          <m:r>
+                            <a:rPr lang="en-AU" b="0" i="1" dirty="0" smtClean="0">
+                              <a:solidFill>
+                                <a:schemeClr val="tx1"/>
+                              </a:solidFill>
+                              <a:latin typeface="Cambria Math" charset="0"/>
+                            </a:rPr>
+                            <m:t>𝑤</m:t>
+                          </m:r>
+                        </m:sub>
+                      </m:sSub>
+                    </m:oMath>
+                  </m:oMathPara>
+                </a14:m>
+                <a:endParaRPr lang="en-US" dirty="0">
+                  <a:solidFill>
+                    <a:schemeClr val="tx1"/>
+                  </a:solidFill>
+                </a:endParaRPr>
+              </a:p>
+            </p:txBody>
+          </p:sp>
+        </mc:Choice>
+        <mc:Fallback>
+          <p:sp>
+            <p:nvSpPr>
+              <p:cNvPr id="4" name="Oval 3"/>
+              <p:cNvSpPr>
+                <a:spLocks noRot="1" noChangeAspect="1" noMove="1" noResize="1" noEditPoints="1" noAdjustHandles="1" noChangeArrowheads="1" noChangeShapeType="1" noTextEdit="1"/>
+              </p:cNvSpPr>
+              <p:nvPr/>
+            </p:nvSpPr>
+            <p:spPr>
+              <a:xfrm>
+                <a:off x="2051720" y="1565176"/>
+                <a:ext cx="792088" cy="792088"/>
+              </a:xfrm>
+              <a:prstGeom prst="ellipse">
+                <a:avLst/>
+              </a:prstGeom>
+              <a:blipFill rotWithShape="0">
+                <a:blip r:embed="rId2"/>
+                <a:stretch>
+                  <a:fillRect/>
+                </a:stretch>
+              </a:blipFill>
+              <a:ln>
+                <a:solidFill>
+                  <a:schemeClr val="tx1"/>
+                </a:solidFill>
+              </a:ln>
+            </p:spPr>
+            <p:txBody>
+              <a:bodyPr/>
+              <a:lstStyle/>
+              <a:p>
+                <a:r>
+                  <a:rPr lang="en-US">
+                    <a:noFill/>
+                  </a:rPr>
+                  <a:t> </a:t>
+                </a:r>
+              </a:p>
+            </p:txBody>
+          </p:sp>
+        </mc:Fallback>
+      </mc:AlternateContent>
+      <mc:AlternateContent xmlns:mc="http://schemas.openxmlformats.org/markup-compatibility/2006">
+        <mc:Choice xmlns:a14="http://schemas.microsoft.com/office/drawing/2010/main" Requires="a14">
+          <p:sp>
+            <p:nvSpPr>
+              <p:cNvPr id="6" name="Oval 5"/>
+              <p:cNvSpPr/>
+              <p:nvPr/>
+            </p:nvSpPr>
+            <p:spPr>
+              <a:xfrm>
+                <a:off x="331912" y="1565176"/>
+                <a:ext cx="792088" cy="792088"/>
+              </a:xfrm>
+              <a:prstGeom prst="ellipse">
+                <a:avLst/>
+              </a:prstGeom>
+              <a:noFill/>
+              <a:ln>
+                <a:solidFill>
+                  <a:schemeClr val="tx1"/>
+                </a:solidFill>
+              </a:ln>
+            </p:spPr>
+            <p:style>
+              <a:lnRef idx="2">
+                <a:schemeClr val="accent1">
+                  <a:shade val="50000"/>
+                </a:schemeClr>
+              </a:lnRef>
+              <a:fillRef idx="1">
+                <a:schemeClr val="accent1"/>
+              </a:fillRef>
+              <a:effectRef idx="0">
+                <a:schemeClr val="accent1"/>
+              </a:effectRef>
+              <a:fontRef idx="minor">
+                <a:schemeClr val="lt1"/>
+              </a:fontRef>
+            </p:style>
+            <p:txBody>
+              <a:bodyPr rtlCol="0" anchor="ctr"/>
+              <a:lstStyle/>
+              <a:p>
+                <a:pPr algn="ctr"/>
+                <a14:m>
+                  <m:oMathPara xmlns:m="http://schemas.openxmlformats.org/officeDocument/2006/math">
+                    <m:oMathParaPr>
+                      <m:jc m:val="centerGroup"/>
+                    </m:oMathParaPr>
+                    <m:oMath xmlns:m="http://schemas.openxmlformats.org/officeDocument/2006/math">
+                      <m:sSub>
+                        <m:sSubPr>
+                          <m:ctrlPr>
+                            <a:rPr lang="en-US" i="1" dirty="0" smtClean="0">
+                              <a:solidFill>
+                                <a:schemeClr val="tx1"/>
+                              </a:solidFill>
+                              <a:latin typeface="Cambria Math" charset="0"/>
+                            </a:rPr>
+                          </m:ctrlPr>
+                        </m:sSubPr>
+                        <m:e>
+                          <m:r>
+                            <a:rPr lang="en-AU" b="0" i="1" dirty="0" smtClean="0">
+                              <a:solidFill>
+                                <a:schemeClr val="tx1"/>
+                              </a:solidFill>
+                              <a:latin typeface="Cambria Math" charset="0"/>
+                            </a:rPr>
+                            <m:t>𝑆</m:t>
+                          </m:r>
+                        </m:e>
+                        <m:sub>
+                          <m:r>
+                            <a:rPr lang="en-AU" b="0" i="1" dirty="0" smtClean="0">
+                              <a:solidFill>
+                                <a:schemeClr val="tx1"/>
+                              </a:solidFill>
+                              <a:latin typeface="Cambria Math" charset="0"/>
+                            </a:rPr>
+                            <m:t>𝑖</m:t>
+                          </m:r>
+                        </m:sub>
+                      </m:sSub>
+                    </m:oMath>
+                  </m:oMathPara>
+                </a14:m>
+                <a:endParaRPr lang="en-US" dirty="0">
+                  <a:solidFill>
+                    <a:schemeClr val="tx1"/>
+                  </a:solidFill>
+                </a:endParaRPr>
+              </a:p>
+            </p:txBody>
+          </p:sp>
+        </mc:Choice>
+        <mc:Fallback>
+          <p:sp>
+            <p:nvSpPr>
+              <p:cNvPr id="6" name="Oval 5"/>
+              <p:cNvSpPr>
+                <a:spLocks noRot="1" noChangeAspect="1" noMove="1" noResize="1" noEditPoints="1" noAdjustHandles="1" noChangeArrowheads="1" noChangeShapeType="1" noTextEdit="1"/>
+              </p:cNvSpPr>
+              <p:nvPr/>
+            </p:nvSpPr>
+            <p:spPr>
+              <a:xfrm>
+                <a:off x="331912" y="1565176"/>
+                <a:ext cx="792088" cy="792088"/>
+              </a:xfrm>
+              <a:prstGeom prst="ellipse">
+                <a:avLst/>
+              </a:prstGeom>
+              <a:blipFill rotWithShape="0">
+                <a:blip r:embed="rId3"/>
+                <a:stretch>
+                  <a:fillRect/>
+                </a:stretch>
+              </a:blipFill>
+              <a:ln>
+                <a:solidFill>
+                  <a:schemeClr val="tx1"/>
+                </a:solidFill>
+              </a:ln>
+            </p:spPr>
+            <p:txBody>
+              <a:bodyPr/>
+              <a:lstStyle/>
+              <a:p>
+                <a:r>
+                  <a:rPr lang="en-US">
+                    <a:noFill/>
+                  </a:rPr>
+                  <a:t> </a:t>
+                </a:r>
+              </a:p>
+            </p:txBody>
+          </p:sp>
+        </mc:Fallback>
+      </mc:AlternateContent>
+      <p:cxnSp>
+        <p:nvCxnSpPr>
+          <p:cNvPr id="8" name="Straight Arrow Connector 7"/>
+          <p:cNvCxnSpPr>
+            <a:stCxn id="6" idx="6"/>
+            <a:endCxn id="4" idx="2"/>
+          </p:cNvCxnSpPr>
+          <p:nvPr/>
+        </p:nvCxnSpPr>
+        <p:spPr>
+          <a:xfrm>
+            <a:off x="1124000" y="1961220"/>
+            <a:ext cx="927720" cy="0"/>
+          </a:xfrm>
+          <a:prstGeom prst="straightConnector1">
+            <a:avLst/>
+          </a:prstGeom>
+          <a:ln>
+            <a:solidFill>
+              <a:schemeClr val="tx1"/>
+            </a:solidFill>
+            <a:tailEnd type="triangle"/>
+          </a:ln>
+        </p:spPr>
+        <p:style>
+          <a:lnRef idx="1">
+            <a:schemeClr val="accent1"/>
+          </a:lnRef>
+          <a:fillRef idx="0">
+            <a:schemeClr val="accent1"/>
+          </a:fillRef>
+          <a:effectRef idx="0">
+            <a:schemeClr val="accent1"/>
+          </a:effectRef>
+          <a:fontRef idx="minor">
+            <a:schemeClr val="tx1"/>
+          </a:fontRef>
+        </p:style>
+      </p:cxnSp>
+      <mc:AlternateContent xmlns:mc="http://schemas.openxmlformats.org/markup-compatibility/2006">
+        <mc:Choice xmlns:a14="http://schemas.microsoft.com/office/drawing/2010/main" Requires="a14">
+          <p:sp>
+            <p:nvSpPr>
+              <p:cNvPr id="9" name="Oval 8"/>
+              <p:cNvSpPr/>
+              <p:nvPr/>
+            </p:nvSpPr>
+            <p:spPr>
+              <a:xfrm>
+                <a:off x="3771528" y="1551180"/>
+                <a:ext cx="792088" cy="792088"/>
+              </a:xfrm>
+              <a:prstGeom prst="ellipse">
+                <a:avLst/>
+              </a:prstGeom>
+              <a:noFill/>
+              <a:ln>
+                <a:solidFill>
+                  <a:schemeClr val="tx1"/>
+                </a:solidFill>
+              </a:ln>
+            </p:spPr>
+            <p:style>
+              <a:lnRef idx="2">
+                <a:schemeClr val="accent1">
+                  <a:shade val="50000"/>
+                </a:schemeClr>
+              </a:lnRef>
+              <a:fillRef idx="1">
+                <a:schemeClr val="accent1"/>
+              </a:fillRef>
+              <a:effectRef idx="0">
+                <a:schemeClr val="accent1"/>
+              </a:effectRef>
+              <a:fontRef idx="minor">
+                <a:schemeClr val="lt1"/>
+              </a:fontRef>
+            </p:style>
+            <p:txBody>
+              <a:bodyPr rtlCol="0" anchor="ctr"/>
+              <a:lstStyle/>
+              <a:p>
+                <a:pPr algn="ctr"/>
+                <a14:m>
+                  <m:oMathPara xmlns:m="http://schemas.openxmlformats.org/officeDocument/2006/math">
+                    <m:oMathParaPr>
+                      <m:jc m:val="centerGroup"/>
+                    </m:oMathParaPr>
+                    <m:oMath xmlns:m="http://schemas.openxmlformats.org/officeDocument/2006/math">
+                      <m:sSub>
+                        <m:sSubPr>
+                          <m:ctrlPr>
+                            <a:rPr lang="en-US" i="1" dirty="0" smtClean="0">
+                              <a:solidFill>
+                                <a:schemeClr val="tx1"/>
+                              </a:solidFill>
+                              <a:latin typeface="Cambria Math" charset="0"/>
+                            </a:rPr>
+                          </m:ctrlPr>
+                        </m:sSubPr>
+                        <m:e>
+                          <m:r>
+                            <a:rPr lang="en-AU" b="0" i="1" dirty="0" smtClean="0">
+                              <a:solidFill>
+                                <a:schemeClr val="tx1"/>
+                              </a:solidFill>
+                              <a:latin typeface="Cambria Math" charset="0"/>
+                            </a:rPr>
+                            <m:t>𝑆</m:t>
+                          </m:r>
+                        </m:e>
+                        <m:sub>
+                          <m:r>
+                            <a:rPr lang="en-AU" b="0" i="1" dirty="0" smtClean="0">
+                              <a:solidFill>
+                                <a:schemeClr val="tx1"/>
+                              </a:solidFill>
+                              <a:latin typeface="Cambria Math" charset="0"/>
+                            </a:rPr>
+                            <m:t>1</m:t>
+                          </m:r>
+                        </m:sub>
+                      </m:sSub>
+                    </m:oMath>
+                  </m:oMathPara>
+                </a14:m>
+                <a:endParaRPr lang="en-US" dirty="0">
+                  <a:solidFill>
+                    <a:schemeClr val="tx1"/>
+                  </a:solidFill>
+                </a:endParaRPr>
+              </a:p>
+            </p:txBody>
+          </p:sp>
+        </mc:Choice>
+        <mc:Fallback>
+          <p:sp>
+            <p:nvSpPr>
+              <p:cNvPr id="9" name="Oval 8"/>
+              <p:cNvSpPr>
+                <a:spLocks noRot="1" noChangeAspect="1" noMove="1" noResize="1" noEditPoints="1" noAdjustHandles="1" noChangeArrowheads="1" noChangeShapeType="1" noTextEdit="1"/>
+              </p:cNvSpPr>
+              <p:nvPr/>
+            </p:nvSpPr>
+            <p:spPr>
+              <a:xfrm>
+                <a:off x="3771528" y="1551180"/>
+                <a:ext cx="792088" cy="792088"/>
+              </a:xfrm>
+              <a:prstGeom prst="ellipse">
+                <a:avLst/>
+              </a:prstGeom>
+              <a:blipFill rotWithShape="0">
+                <a:blip r:embed="rId4"/>
+                <a:stretch>
+                  <a:fillRect/>
+                </a:stretch>
+              </a:blipFill>
+              <a:ln>
+                <a:solidFill>
+                  <a:schemeClr val="tx1"/>
+                </a:solidFill>
+              </a:ln>
+            </p:spPr>
+            <p:txBody>
+              <a:bodyPr/>
+              <a:lstStyle/>
+              <a:p>
+                <a:r>
+                  <a:rPr lang="en-US">
+                    <a:noFill/>
+                  </a:rPr>
+                  <a:t> </a:t>
+                </a:r>
+              </a:p>
+            </p:txBody>
+          </p:sp>
+        </mc:Fallback>
+      </mc:AlternateContent>
+      <mc:AlternateContent xmlns:mc="http://schemas.openxmlformats.org/markup-compatibility/2006">
+        <mc:Choice xmlns:a14="http://schemas.microsoft.com/office/drawing/2010/main" Requires="a14">
+          <p:sp>
+            <p:nvSpPr>
+              <p:cNvPr id="11" name="Oval 10"/>
+              <p:cNvSpPr/>
+              <p:nvPr/>
+            </p:nvSpPr>
+            <p:spPr>
+              <a:xfrm>
+                <a:off x="7211144" y="1565176"/>
+                <a:ext cx="792088" cy="792088"/>
+              </a:xfrm>
+              <a:prstGeom prst="ellipse">
+                <a:avLst/>
+              </a:prstGeom>
+              <a:noFill/>
+              <a:ln>
+                <a:solidFill>
+                  <a:schemeClr val="tx1"/>
+                </a:solidFill>
+              </a:ln>
+            </p:spPr>
+            <p:style>
+              <a:lnRef idx="2">
+                <a:schemeClr val="accent1">
+                  <a:shade val="50000"/>
+                </a:schemeClr>
+              </a:lnRef>
+              <a:fillRef idx="1">
+                <a:schemeClr val="accent1"/>
+              </a:fillRef>
+              <a:effectRef idx="0">
+                <a:schemeClr val="accent1"/>
+              </a:effectRef>
+              <a:fontRef idx="minor">
+                <a:schemeClr val="lt1"/>
+              </a:fontRef>
+            </p:style>
+            <p:txBody>
+              <a:bodyPr rtlCol="0" anchor="ctr"/>
+              <a:lstStyle/>
+              <a:p>
+                <a:pPr algn="ctr"/>
+                <a14:m>
+                  <m:oMathPara xmlns:m="http://schemas.openxmlformats.org/officeDocument/2006/math">
+                    <m:oMathParaPr>
+                      <m:jc m:val="centerGroup"/>
+                    </m:oMathParaPr>
+                    <m:oMath xmlns:m="http://schemas.openxmlformats.org/officeDocument/2006/math">
+                      <m:sSub>
+                        <m:sSubPr>
+                          <m:ctrlPr>
+                            <a:rPr lang="en-US" i="1" dirty="0" smtClean="0">
+                              <a:solidFill>
+                                <a:schemeClr val="tx1"/>
+                              </a:solidFill>
+                              <a:latin typeface="Cambria Math" charset="0"/>
+                            </a:rPr>
+                          </m:ctrlPr>
+                        </m:sSubPr>
+                        <m:e>
+                          <m:r>
+                            <a:rPr lang="en-AU" b="0" i="1" dirty="0" smtClean="0">
+                              <a:solidFill>
+                                <a:schemeClr val="tx1"/>
+                              </a:solidFill>
+                              <a:latin typeface="Cambria Math" charset="0"/>
+                            </a:rPr>
+                            <m:t>𝑆</m:t>
+                          </m:r>
+                        </m:e>
+                        <m:sub>
+                          <m:r>
+                            <a:rPr lang="en-AU" b="0" i="1" dirty="0" smtClean="0">
+                              <a:solidFill>
+                                <a:schemeClr val="tx1"/>
+                              </a:solidFill>
+                              <a:latin typeface="Cambria Math" charset="0"/>
+                            </a:rPr>
+                            <m:t>𝑜</m:t>
+                          </m:r>
+                        </m:sub>
+                      </m:sSub>
+                    </m:oMath>
+                  </m:oMathPara>
+                </a14:m>
+                <a:endParaRPr lang="en-US" dirty="0">
+                  <a:solidFill>
+                    <a:schemeClr val="tx1"/>
+                  </a:solidFill>
+                </a:endParaRPr>
+              </a:p>
+            </p:txBody>
+          </p:sp>
+        </mc:Choice>
+        <mc:Fallback>
+          <p:sp>
+            <p:nvSpPr>
+              <p:cNvPr id="11" name="Oval 10"/>
+              <p:cNvSpPr>
+                <a:spLocks noRot="1" noChangeAspect="1" noMove="1" noResize="1" noEditPoints="1" noAdjustHandles="1" noChangeArrowheads="1" noChangeShapeType="1" noTextEdit="1"/>
+              </p:cNvSpPr>
+              <p:nvPr/>
+            </p:nvSpPr>
+            <p:spPr>
+              <a:xfrm>
+                <a:off x="7211144" y="1565176"/>
+                <a:ext cx="792088" cy="792088"/>
+              </a:xfrm>
+              <a:prstGeom prst="ellipse">
+                <a:avLst/>
+              </a:prstGeom>
+              <a:blipFill rotWithShape="0">
+                <a:blip r:embed="rId5"/>
+                <a:stretch>
+                  <a:fillRect/>
+                </a:stretch>
+              </a:blipFill>
+              <a:ln>
+                <a:solidFill>
+                  <a:schemeClr val="tx1"/>
+                </a:solidFill>
+              </a:ln>
+            </p:spPr>
+            <p:txBody>
+              <a:bodyPr/>
+              <a:lstStyle/>
+              <a:p>
+                <a:r>
+                  <a:rPr lang="en-US">
+                    <a:noFill/>
+                  </a:rPr>
+                  <a:t> </a:t>
+                </a:r>
+              </a:p>
+            </p:txBody>
+          </p:sp>
+        </mc:Fallback>
+      </mc:AlternateContent>
+      <mc:AlternateContent xmlns:mc="http://schemas.openxmlformats.org/markup-compatibility/2006">
+        <mc:Choice xmlns:a14="http://schemas.microsoft.com/office/drawing/2010/main" Requires="a14">
+          <p:sp>
+            <p:nvSpPr>
+              <p:cNvPr id="12" name="Oval 11"/>
+              <p:cNvSpPr/>
+              <p:nvPr/>
+            </p:nvSpPr>
+            <p:spPr>
+              <a:xfrm>
+                <a:off x="8930952" y="1565176"/>
+                <a:ext cx="792088" cy="792088"/>
+              </a:xfrm>
+              <a:prstGeom prst="ellipse">
+                <a:avLst/>
+              </a:prstGeom>
+              <a:noFill/>
+              <a:ln>
+                <a:solidFill>
+                  <a:schemeClr val="tx1"/>
+                </a:solidFill>
+              </a:ln>
+            </p:spPr>
+            <p:style>
+              <a:lnRef idx="2">
+                <a:schemeClr val="accent1">
+                  <a:shade val="50000"/>
+                </a:schemeClr>
+              </a:lnRef>
+              <a:fillRef idx="1">
+                <a:schemeClr val="accent1"/>
+              </a:fillRef>
+              <a:effectRef idx="0">
+                <a:schemeClr val="accent1"/>
+              </a:effectRef>
+              <a:fontRef idx="minor">
+                <a:schemeClr val="lt1"/>
+              </a:fontRef>
+            </p:style>
+            <p:txBody>
+              <a:bodyPr rtlCol="0" anchor="ctr"/>
+              <a:lstStyle/>
+              <a:p>
+                <a:pPr algn="ctr"/>
+                <a14:m>
+                  <m:oMathPara xmlns:m="http://schemas.openxmlformats.org/officeDocument/2006/math">
+                    <m:oMathParaPr>
+                      <m:jc m:val="centerGroup"/>
+                    </m:oMathParaPr>
+                    <m:oMath xmlns:m="http://schemas.openxmlformats.org/officeDocument/2006/math">
+                      <m:sSub>
+                        <m:sSubPr>
+                          <m:ctrlPr>
+                            <a:rPr lang="en-US" i="1" dirty="0" smtClean="0">
+                              <a:solidFill>
+                                <a:schemeClr val="tx1"/>
+                              </a:solidFill>
+                              <a:latin typeface="Cambria Math" charset="0"/>
+                            </a:rPr>
+                          </m:ctrlPr>
+                        </m:sSubPr>
+                        <m:e>
+                          <m:r>
+                            <a:rPr lang="en-AU" b="0" i="1" dirty="0" smtClean="0">
+                              <a:solidFill>
+                                <a:schemeClr val="tx1"/>
+                              </a:solidFill>
+                              <a:latin typeface="Cambria Math" charset="0"/>
+                            </a:rPr>
+                            <m:t>𝑆</m:t>
+                          </m:r>
+                        </m:e>
+                        <m:sub>
+                          <m:r>
+                            <a:rPr lang="en-AU" b="0" i="1" dirty="0" smtClean="0">
+                              <a:solidFill>
+                                <a:schemeClr val="tx1"/>
+                              </a:solidFill>
+                              <a:latin typeface="Cambria Math" charset="0"/>
+                            </a:rPr>
+                            <m:t>𝑒</m:t>
+                          </m:r>
+                        </m:sub>
+                      </m:sSub>
+                    </m:oMath>
+                  </m:oMathPara>
+                </a14:m>
+                <a:endParaRPr lang="en-US" dirty="0">
+                  <a:solidFill>
+                    <a:schemeClr val="tx1"/>
+                  </a:solidFill>
+                </a:endParaRPr>
+              </a:p>
+            </p:txBody>
+          </p:sp>
+        </mc:Choice>
+        <mc:Fallback>
+          <p:sp>
+            <p:nvSpPr>
+              <p:cNvPr id="12" name="Oval 11"/>
+              <p:cNvSpPr>
+                <a:spLocks noRot="1" noChangeAspect="1" noMove="1" noResize="1" noEditPoints="1" noAdjustHandles="1" noChangeArrowheads="1" noChangeShapeType="1" noTextEdit="1"/>
+              </p:cNvSpPr>
+              <p:nvPr/>
+            </p:nvSpPr>
+            <p:spPr>
+              <a:xfrm>
+                <a:off x="8930952" y="1565176"/>
+                <a:ext cx="792088" cy="792088"/>
+              </a:xfrm>
+              <a:prstGeom prst="ellipse">
+                <a:avLst/>
+              </a:prstGeom>
+              <a:blipFill rotWithShape="0">
+                <a:blip r:embed="rId6"/>
+                <a:stretch>
+                  <a:fillRect/>
+                </a:stretch>
+              </a:blipFill>
+              <a:ln>
+                <a:solidFill>
+                  <a:schemeClr val="tx1"/>
+                </a:solidFill>
+              </a:ln>
+            </p:spPr>
+            <p:txBody>
+              <a:bodyPr/>
+              <a:lstStyle/>
+              <a:p>
+                <a:r>
+                  <a:rPr lang="en-US">
+                    <a:noFill/>
+                  </a:rPr>
+                  <a:t> </a:t>
+                </a:r>
+              </a:p>
+            </p:txBody>
+          </p:sp>
+        </mc:Fallback>
+      </mc:AlternateContent>
+      <p:cxnSp>
+        <p:nvCxnSpPr>
+          <p:cNvPr id="14" name="Straight Arrow Connector 13"/>
+          <p:cNvCxnSpPr>
+            <a:stCxn id="4" idx="6"/>
+            <a:endCxn id="9" idx="2"/>
+          </p:cNvCxnSpPr>
+          <p:nvPr/>
+        </p:nvCxnSpPr>
+        <p:spPr>
+          <a:xfrm flipV="1">
+            <a:off x="2843808" y="1947224"/>
+            <a:ext cx="927720" cy="13996"/>
+          </a:xfrm>
+          <a:prstGeom prst="straightConnector1">
+            <a:avLst/>
+          </a:prstGeom>
+          <a:ln>
+            <a:solidFill>
+              <a:schemeClr val="tx1"/>
+            </a:solidFill>
+            <a:tailEnd type="triangle"/>
+          </a:ln>
+        </p:spPr>
+        <p:style>
+          <a:lnRef idx="1">
+            <a:schemeClr val="accent1"/>
+          </a:lnRef>
+          <a:fillRef idx="0">
+            <a:schemeClr val="accent1"/>
+          </a:fillRef>
+          <a:effectRef idx="0">
+            <a:schemeClr val="accent1"/>
+          </a:effectRef>
+          <a:fontRef idx="minor">
+            <a:schemeClr val="tx1"/>
+          </a:fontRef>
+        </p:style>
+      </p:cxnSp>
+      <p:cxnSp>
+        <p:nvCxnSpPr>
+          <p:cNvPr id="16" name="Straight Arrow Connector 15"/>
+          <p:cNvCxnSpPr>
+            <a:stCxn id="9" idx="6"/>
+          </p:cNvCxnSpPr>
+          <p:nvPr/>
+        </p:nvCxnSpPr>
+        <p:spPr>
+          <a:xfrm>
+            <a:off x="4563616" y="1947224"/>
+            <a:ext cx="927720" cy="13996"/>
+          </a:xfrm>
+          <a:prstGeom prst="straightConnector1">
+            <a:avLst/>
+          </a:prstGeom>
+          <a:ln>
+            <a:solidFill>
+              <a:schemeClr val="tx1"/>
+            </a:solidFill>
+            <a:tailEnd type="triangle"/>
+          </a:ln>
+        </p:spPr>
+        <p:style>
+          <a:lnRef idx="1">
+            <a:schemeClr val="accent1"/>
+          </a:lnRef>
+          <a:fillRef idx="0">
+            <a:schemeClr val="accent1"/>
+          </a:fillRef>
+          <a:effectRef idx="0">
+            <a:schemeClr val="accent1"/>
+          </a:effectRef>
+          <a:fontRef idx="minor">
+            <a:schemeClr val="tx1"/>
+          </a:fontRef>
+        </p:style>
+      </p:cxnSp>
+      <p:cxnSp>
+        <p:nvCxnSpPr>
+          <p:cNvPr id="18" name="Straight Arrow Connector 17"/>
+          <p:cNvCxnSpPr>
+            <a:endCxn id="11" idx="2"/>
+          </p:cNvCxnSpPr>
+          <p:nvPr/>
+        </p:nvCxnSpPr>
+        <p:spPr>
+          <a:xfrm>
+            <a:off x="6283424" y="1961220"/>
+            <a:ext cx="927720" cy="0"/>
+          </a:xfrm>
+          <a:prstGeom prst="straightConnector1">
+            <a:avLst/>
+          </a:prstGeom>
+          <a:ln>
+            <a:solidFill>
+              <a:schemeClr val="tx1"/>
+            </a:solidFill>
+            <a:tailEnd type="triangle"/>
+          </a:ln>
+        </p:spPr>
+        <p:style>
+          <a:lnRef idx="1">
+            <a:schemeClr val="accent1"/>
+          </a:lnRef>
+          <a:fillRef idx="0">
+            <a:schemeClr val="accent1"/>
+          </a:fillRef>
+          <a:effectRef idx="0">
+            <a:schemeClr val="accent1"/>
+          </a:effectRef>
+          <a:fontRef idx="minor">
+            <a:schemeClr val="tx1"/>
+          </a:fontRef>
+        </p:style>
+      </p:cxnSp>
+      <p:cxnSp>
+        <p:nvCxnSpPr>
+          <p:cNvPr id="20" name="Straight Arrow Connector 19"/>
+          <p:cNvCxnSpPr>
+            <a:stCxn id="11" idx="6"/>
+            <a:endCxn id="12" idx="2"/>
+          </p:cNvCxnSpPr>
+          <p:nvPr/>
+        </p:nvCxnSpPr>
+        <p:spPr>
+          <a:xfrm>
+            <a:off x="8003232" y="1961220"/>
+            <a:ext cx="927720" cy="0"/>
+          </a:xfrm>
+          <a:prstGeom prst="straightConnector1">
+            <a:avLst/>
+          </a:prstGeom>
+          <a:ln>
+            <a:solidFill>
+              <a:schemeClr val="tx1"/>
+            </a:solidFill>
+            <a:tailEnd type="triangle"/>
+          </a:ln>
+        </p:spPr>
+        <p:style>
+          <a:lnRef idx="1">
+            <a:schemeClr val="accent1"/>
+          </a:lnRef>
+          <a:fillRef idx="0">
+            <a:schemeClr val="accent1"/>
+          </a:fillRef>
+          <a:effectRef idx="0">
+            <a:schemeClr val="accent1"/>
+          </a:effectRef>
+          <a:fontRef idx="minor">
+            <a:schemeClr val="tx1"/>
+          </a:fontRef>
+        </p:style>
+      </p:cxnSp>
+      <mc:AlternateContent xmlns:mc="http://schemas.openxmlformats.org/markup-compatibility/2006">
+        <mc:Choice xmlns:a14="http://schemas.microsoft.com/office/drawing/2010/main" Requires="a14">
+          <p:sp>
+            <p:nvSpPr>
+              <p:cNvPr id="21" name="TextBox 20"/>
+              <p:cNvSpPr txBox="1"/>
+              <p:nvPr/>
+            </p:nvSpPr>
+            <p:spPr>
+              <a:xfrm>
+                <a:off x="1286170" y="1619508"/>
+                <a:ext cx="576064" cy="369332"/>
+              </a:xfrm>
+              <a:prstGeom prst="rect">
+                <a:avLst/>
+              </a:prstGeom>
+              <a:noFill/>
+            </p:spPr>
+            <p:txBody>
+              <a:bodyPr wrap="square" rtlCol="0">
+                <a:spAutoFit/>
+              </a:bodyPr>
+              <a:lstStyle/>
+              <a:p>
+                <a14:m>
+                  <m:oMathPara xmlns:m="http://schemas.openxmlformats.org/officeDocument/2006/math">
+                    <m:oMathParaPr>
+                      <m:jc m:val="centerGroup"/>
+                    </m:oMathParaPr>
+                    <m:oMath xmlns:m="http://schemas.openxmlformats.org/officeDocument/2006/math">
+                      <m:r>
+                        <a:rPr lang="en-AU" b="0" i="1" smtClean="0">
+                          <a:latin typeface="Cambria Math" charset="0"/>
+                        </a:rPr>
+                        <m:t>𝑖</m:t>
+                      </m:r>
+                    </m:oMath>
+                  </m:oMathPara>
+                </a14:m>
+                <a:endParaRPr lang="en-US" dirty="0"/>
+              </a:p>
+            </p:txBody>
+          </p:sp>
+        </mc:Choice>
+        <mc:Fallback>
+          <p:sp>
+            <p:nvSpPr>
+              <p:cNvPr id="21" name="TextBox 20"/>
+              <p:cNvSpPr txBox="1">
+                <a:spLocks noRot="1" noChangeAspect="1" noMove="1" noResize="1" noEditPoints="1" noAdjustHandles="1" noChangeArrowheads="1" noChangeShapeType="1" noTextEdit="1"/>
+              </p:cNvSpPr>
+              <p:nvPr/>
+            </p:nvSpPr>
+            <p:spPr>
+              <a:xfrm>
+                <a:off x="1286170" y="1619508"/>
+                <a:ext cx="576064" cy="369332"/>
+              </a:xfrm>
+              <a:prstGeom prst="rect">
+                <a:avLst/>
+              </a:prstGeom>
+              <a:blipFill rotWithShape="0">
+                <a:blip r:embed="rId7"/>
+                <a:stretch>
+                  <a:fillRect/>
+                </a:stretch>
+              </a:blipFill>
+            </p:spPr>
+            <p:txBody>
+              <a:bodyPr/>
+              <a:lstStyle/>
+              <a:p>
+                <a:r>
+                  <a:rPr lang="en-US">
+                    <a:noFill/>
+                  </a:rPr>
+                  <a:t> </a:t>
+                </a:r>
+              </a:p>
+            </p:txBody>
+          </p:sp>
+        </mc:Fallback>
+      </mc:AlternateContent>
+      <mc:AlternateContent xmlns:mc="http://schemas.openxmlformats.org/markup-compatibility/2006">
+        <mc:Choice xmlns:a14="http://schemas.microsoft.com/office/drawing/2010/main" Requires="a14">
+          <p:sp>
+            <p:nvSpPr>
+              <p:cNvPr id="22" name="TextBox 21"/>
+              <p:cNvSpPr txBox="1"/>
+              <p:nvPr/>
+            </p:nvSpPr>
+            <p:spPr>
+              <a:xfrm>
+                <a:off x="2987824" y="1551180"/>
+                <a:ext cx="576064" cy="369332"/>
+              </a:xfrm>
+              <a:prstGeom prst="rect">
+                <a:avLst/>
+              </a:prstGeom>
+              <a:noFill/>
+            </p:spPr>
+            <p:txBody>
+              <a:bodyPr wrap="square" rtlCol="0">
+                <a:spAutoFit/>
+              </a:bodyPr>
+              <a:lstStyle/>
+              <a:p>
+                <a14:m>
+                  <m:oMathPara xmlns:m="http://schemas.openxmlformats.org/officeDocument/2006/math">
+                    <m:oMathParaPr>
+                      <m:jc m:val="centerGroup"/>
+                    </m:oMathParaPr>
+                    <m:oMath xmlns:m="http://schemas.openxmlformats.org/officeDocument/2006/math">
+                      <m:r>
+                        <a:rPr lang="en-AU" b="0" i="1" dirty="0" smtClean="0">
+                          <a:latin typeface="Cambria Math" charset="0"/>
+                        </a:rPr>
+                        <m:t>[</m:t>
+                      </m:r>
+                      <m:sSub>
+                        <m:sSubPr>
+                          <m:ctrlPr>
+                            <a:rPr lang="en-US" i="1" dirty="0">
+                              <a:latin typeface="Cambria Math" charset="0"/>
+                            </a:rPr>
+                          </m:ctrlPr>
+                        </m:sSubPr>
+                        <m:e>
+                          <m:r>
+                            <a:rPr lang="en-AU" b="0" i="1" dirty="0" smtClean="0">
+                              <a:latin typeface="Cambria Math" charset="0"/>
+                            </a:rPr>
+                            <m:t>𝑤</m:t>
+                          </m:r>
+                        </m:e>
+                        <m:sub>
+                          <m:r>
+                            <a:rPr lang="en-AU" b="0" i="1" dirty="0" smtClean="0">
+                              <a:latin typeface="Cambria Math" charset="0"/>
+                            </a:rPr>
+                            <m:t>1</m:t>
+                          </m:r>
+                        </m:sub>
+                      </m:sSub>
+                      <m:r>
+                        <a:rPr lang="en-AU" b="0" i="1" dirty="0" smtClean="0">
+                          <a:latin typeface="Cambria Math" charset="0"/>
+                        </a:rPr>
+                        <m:t>]</m:t>
+                      </m:r>
+                      <m:sSub>
+                        <m:sSubPr>
+                          <m:ctrlPr>
+                            <a:rPr lang="en-US" b="0" i="1" dirty="0" smtClean="0">
+                              <a:latin typeface="Cambria Math" charset="0"/>
+                            </a:rPr>
+                          </m:ctrlPr>
+                        </m:sSubPr>
+                        <m:e>
+                          <m:r>
+                            <a:rPr lang="en-AU" b="0" i="1" dirty="0" smtClean="0">
+                              <a:latin typeface="Cambria Math" charset="0"/>
+                            </a:rPr>
+                            <m:t>𝑓</m:t>
+                          </m:r>
+                        </m:e>
+                        <m:sub>
+                          <m:r>
+                            <a:rPr lang="en-AU" b="0" i="1" dirty="0" smtClean="0">
+                              <a:latin typeface="Cambria Math" charset="0"/>
+                            </a:rPr>
+                            <m:t>1</m:t>
+                          </m:r>
+                        </m:sub>
+                      </m:sSub>
+                    </m:oMath>
+                  </m:oMathPara>
+                </a14:m>
+                <a:endParaRPr lang="en-US" dirty="0"/>
+              </a:p>
+            </p:txBody>
+          </p:sp>
+        </mc:Choice>
+        <mc:Fallback>
+          <p:sp>
+            <p:nvSpPr>
+              <p:cNvPr id="22" name="TextBox 21"/>
+              <p:cNvSpPr txBox="1">
+                <a:spLocks noRot="1" noChangeAspect="1" noMove="1" noResize="1" noEditPoints="1" noAdjustHandles="1" noChangeArrowheads="1" noChangeShapeType="1" noTextEdit="1"/>
+              </p:cNvSpPr>
+              <p:nvPr/>
+            </p:nvSpPr>
+            <p:spPr>
+              <a:xfrm>
+                <a:off x="2987824" y="1551180"/>
+                <a:ext cx="576064" cy="369332"/>
+              </a:xfrm>
+              <a:prstGeom prst="rect">
+                <a:avLst/>
+              </a:prstGeom>
+              <a:blipFill rotWithShape="0">
+                <a:blip r:embed="rId8"/>
+                <a:stretch>
+                  <a:fillRect l="-3158" r="-31579" b="-13115"/>
+                </a:stretch>
+              </a:blipFill>
+            </p:spPr>
+            <p:txBody>
+              <a:bodyPr/>
+              <a:lstStyle/>
+              <a:p>
+                <a:r>
+                  <a:rPr lang="en-US">
+                    <a:noFill/>
+                  </a:rPr>
+                  <a:t> </a:t>
+                </a:r>
+              </a:p>
+            </p:txBody>
+          </p:sp>
+        </mc:Fallback>
+      </mc:AlternateContent>
+      <mc:AlternateContent xmlns:mc="http://schemas.openxmlformats.org/markup-compatibility/2006">
+        <mc:Choice xmlns:a14="http://schemas.microsoft.com/office/drawing/2010/main" Requires="a14">
+          <p:sp>
+            <p:nvSpPr>
+              <p:cNvPr id="23" name="TextBox 22"/>
+              <p:cNvSpPr txBox="1"/>
+              <p:nvPr/>
+            </p:nvSpPr>
+            <p:spPr>
+              <a:xfrm>
+                <a:off x="4644008" y="1556792"/>
+                <a:ext cx="576064" cy="369332"/>
+              </a:xfrm>
+              <a:prstGeom prst="rect">
+                <a:avLst/>
+              </a:prstGeom>
+              <a:noFill/>
+            </p:spPr>
+            <p:txBody>
+              <a:bodyPr wrap="square" rtlCol="0">
+                <a:spAutoFit/>
+              </a:bodyPr>
+              <a:lstStyle/>
+              <a:p>
+                <a14:m>
+                  <m:oMathPara xmlns:m="http://schemas.openxmlformats.org/officeDocument/2006/math">
+                    <m:oMathParaPr>
+                      <m:jc m:val="centerGroup"/>
+                    </m:oMathParaPr>
+                    <m:oMath xmlns:m="http://schemas.openxmlformats.org/officeDocument/2006/math">
+                      <m:r>
+                        <a:rPr lang="en-AU" b="0" i="1" dirty="0" smtClean="0">
+                          <a:latin typeface="Cambria Math" charset="0"/>
+                        </a:rPr>
+                        <m:t>[</m:t>
+                      </m:r>
+                      <m:sSub>
+                        <m:sSubPr>
+                          <m:ctrlPr>
+                            <a:rPr lang="en-US" i="1" dirty="0">
+                              <a:latin typeface="Cambria Math" charset="0"/>
+                            </a:rPr>
+                          </m:ctrlPr>
+                        </m:sSubPr>
+                        <m:e>
+                          <m:r>
+                            <a:rPr lang="en-AU" b="0" i="1" dirty="0" smtClean="0">
+                              <a:latin typeface="Cambria Math" charset="0"/>
+                            </a:rPr>
+                            <m:t>𝑤</m:t>
+                          </m:r>
+                        </m:e>
+                        <m:sub>
+                          <m:r>
+                            <a:rPr lang="en-AU" b="0" i="1" dirty="0" smtClean="0">
+                              <a:latin typeface="Cambria Math" charset="0"/>
+                            </a:rPr>
+                            <m:t>2</m:t>
+                          </m:r>
+                        </m:sub>
+                      </m:sSub>
+                      <m:r>
+                        <a:rPr lang="en-AU" b="0" i="1" dirty="0" smtClean="0">
+                          <a:latin typeface="Cambria Math" charset="0"/>
+                        </a:rPr>
+                        <m:t>]</m:t>
+                      </m:r>
+                      <m:sSub>
+                        <m:sSubPr>
+                          <m:ctrlPr>
+                            <a:rPr lang="en-US" b="0" i="1" dirty="0" smtClean="0">
+                              <a:latin typeface="Cambria Math" charset="0"/>
+                            </a:rPr>
+                          </m:ctrlPr>
+                        </m:sSubPr>
+                        <m:e>
+                          <m:r>
+                            <a:rPr lang="en-AU" b="0" i="1" dirty="0" smtClean="0">
+                              <a:latin typeface="Cambria Math" charset="0"/>
+                            </a:rPr>
+                            <m:t>𝑓</m:t>
+                          </m:r>
+                        </m:e>
+                        <m:sub>
+                          <m:r>
+                            <a:rPr lang="en-AU" b="0" i="1" dirty="0" smtClean="0">
+                              <a:latin typeface="Cambria Math" charset="0"/>
+                            </a:rPr>
+                            <m:t>2</m:t>
+                          </m:r>
+                        </m:sub>
+                      </m:sSub>
+                    </m:oMath>
+                  </m:oMathPara>
+                </a14:m>
+                <a:endParaRPr lang="en-US" dirty="0"/>
+              </a:p>
+            </p:txBody>
+          </p:sp>
+        </mc:Choice>
+        <mc:Fallback>
+          <p:sp>
+            <p:nvSpPr>
+              <p:cNvPr id="23" name="TextBox 22"/>
+              <p:cNvSpPr txBox="1">
+                <a:spLocks noRot="1" noChangeAspect="1" noMove="1" noResize="1" noEditPoints="1" noAdjustHandles="1" noChangeArrowheads="1" noChangeShapeType="1" noTextEdit="1"/>
+              </p:cNvSpPr>
+              <p:nvPr/>
+            </p:nvSpPr>
+            <p:spPr>
+              <a:xfrm>
+                <a:off x="4644008" y="1556792"/>
+                <a:ext cx="576064" cy="369332"/>
+              </a:xfrm>
+              <a:prstGeom prst="rect">
+                <a:avLst/>
+              </a:prstGeom>
+              <a:blipFill rotWithShape="0">
+                <a:blip r:embed="rId9"/>
+                <a:stretch>
+                  <a:fillRect l="-3191" r="-32979" b="-13115"/>
+                </a:stretch>
+              </a:blipFill>
+            </p:spPr>
+            <p:txBody>
+              <a:bodyPr/>
+              <a:lstStyle/>
+              <a:p>
+                <a:r>
+                  <a:rPr lang="en-US">
+                    <a:noFill/>
+                  </a:rPr>
+                  <a:t> </a:t>
+                </a:r>
+              </a:p>
+            </p:txBody>
+          </p:sp>
+        </mc:Fallback>
+      </mc:AlternateContent>
+      <mc:AlternateContent xmlns:mc="http://schemas.openxmlformats.org/markup-compatibility/2006">
+        <mc:Choice xmlns:a14="http://schemas.microsoft.com/office/drawing/2010/main" Requires="a14">
+          <p:sp>
+            <p:nvSpPr>
+              <p:cNvPr id="24" name="TextBox 23"/>
+              <p:cNvSpPr txBox="1"/>
+              <p:nvPr/>
+            </p:nvSpPr>
+            <p:spPr>
+              <a:xfrm>
+                <a:off x="6372200" y="1556792"/>
+                <a:ext cx="576064" cy="369332"/>
+              </a:xfrm>
+              <a:prstGeom prst="rect">
+                <a:avLst/>
+              </a:prstGeom>
+              <a:noFill/>
+            </p:spPr>
+            <p:txBody>
+              <a:bodyPr wrap="square" rtlCol="0">
+                <a:spAutoFit/>
+              </a:bodyPr>
+              <a:lstStyle/>
+              <a:p>
+                <a14:m>
+                  <m:oMathPara xmlns:m="http://schemas.openxmlformats.org/officeDocument/2006/math">
+                    <m:oMathParaPr>
+                      <m:jc m:val="centerGroup"/>
+                    </m:oMathParaPr>
+                    <m:oMath xmlns:m="http://schemas.openxmlformats.org/officeDocument/2006/math">
+                      <m:r>
+                        <a:rPr lang="en-AU" b="0" i="1" dirty="0" smtClean="0">
+                          <a:latin typeface="Cambria Math" charset="0"/>
+                        </a:rPr>
+                        <m:t>[</m:t>
+                      </m:r>
+                      <m:sSub>
+                        <m:sSubPr>
+                          <m:ctrlPr>
+                            <a:rPr lang="en-US" i="1" dirty="0">
+                              <a:latin typeface="Cambria Math" charset="0"/>
+                            </a:rPr>
+                          </m:ctrlPr>
+                        </m:sSubPr>
+                        <m:e>
+                          <m:r>
+                            <a:rPr lang="en-AU" b="0" i="1" dirty="0" smtClean="0">
+                              <a:latin typeface="Cambria Math" charset="0"/>
+                            </a:rPr>
+                            <m:t>𝑤</m:t>
+                          </m:r>
+                        </m:e>
+                        <m:sub>
+                          <m:r>
+                            <a:rPr lang="en-AU" b="0" i="1" dirty="0" smtClean="0">
+                              <a:latin typeface="Cambria Math" charset="0"/>
+                            </a:rPr>
+                            <m:t>𝑛</m:t>
+                          </m:r>
+                        </m:sub>
+                      </m:sSub>
+                      <m:r>
+                        <a:rPr lang="en-AU" b="0" i="1" dirty="0" smtClean="0">
+                          <a:latin typeface="Cambria Math" charset="0"/>
+                        </a:rPr>
+                        <m:t>]</m:t>
+                      </m:r>
+                      <m:sSub>
+                        <m:sSubPr>
+                          <m:ctrlPr>
+                            <a:rPr lang="en-US" b="0" i="1" dirty="0" smtClean="0">
+                              <a:latin typeface="Cambria Math" charset="0"/>
+                            </a:rPr>
+                          </m:ctrlPr>
+                        </m:sSubPr>
+                        <m:e>
+                          <m:r>
+                            <a:rPr lang="en-AU" b="0" i="1" dirty="0" smtClean="0">
+                              <a:latin typeface="Cambria Math" charset="0"/>
+                            </a:rPr>
+                            <m:t>𝑓</m:t>
+                          </m:r>
+                        </m:e>
+                        <m:sub>
+                          <m:r>
+                            <a:rPr lang="en-AU" b="0" i="1" dirty="0" smtClean="0">
+                              <a:latin typeface="Cambria Math" charset="0"/>
+                            </a:rPr>
+                            <m:t>𝑛</m:t>
+                          </m:r>
+                        </m:sub>
+                      </m:sSub>
+                    </m:oMath>
+                  </m:oMathPara>
+                </a14:m>
+                <a:endParaRPr lang="en-US" dirty="0"/>
+              </a:p>
+            </p:txBody>
+          </p:sp>
+        </mc:Choice>
+        <mc:Fallback>
+          <p:sp>
+            <p:nvSpPr>
+              <p:cNvPr id="24" name="TextBox 23"/>
+              <p:cNvSpPr txBox="1">
+                <a:spLocks noRot="1" noChangeAspect="1" noMove="1" noResize="1" noEditPoints="1" noAdjustHandles="1" noChangeArrowheads="1" noChangeShapeType="1" noTextEdit="1"/>
+              </p:cNvSpPr>
+              <p:nvPr/>
+            </p:nvSpPr>
+            <p:spPr>
+              <a:xfrm>
+                <a:off x="6372200" y="1556792"/>
+                <a:ext cx="576064" cy="369332"/>
+              </a:xfrm>
+              <a:prstGeom prst="rect">
+                <a:avLst/>
+              </a:prstGeom>
+              <a:blipFill rotWithShape="0">
+                <a:blip r:embed="rId10"/>
+                <a:stretch>
+                  <a:fillRect l="-3158" r="-32632" b="-13115"/>
+                </a:stretch>
+              </a:blipFill>
+            </p:spPr>
+            <p:txBody>
+              <a:bodyPr/>
+              <a:lstStyle/>
+              <a:p>
+                <a:r>
+                  <a:rPr lang="en-US">
+                    <a:noFill/>
+                  </a:rPr>
+                  <a:t> </a:t>
+                </a:r>
+              </a:p>
+            </p:txBody>
+          </p:sp>
+        </mc:Fallback>
+      </mc:AlternateContent>
+      <mc:AlternateContent xmlns:mc="http://schemas.openxmlformats.org/markup-compatibility/2006">
+        <mc:Choice xmlns:a14="http://schemas.microsoft.com/office/drawing/2010/main" Requires="a14">
+          <p:sp>
+            <p:nvSpPr>
+              <p:cNvPr id="25" name="TextBox 24"/>
+              <p:cNvSpPr txBox="1"/>
+              <p:nvPr/>
+            </p:nvSpPr>
+            <p:spPr>
+              <a:xfrm>
+                <a:off x="8244408" y="1619508"/>
+                <a:ext cx="576064" cy="369332"/>
+              </a:xfrm>
+              <a:prstGeom prst="rect">
+                <a:avLst/>
+              </a:prstGeom>
+              <a:noFill/>
+            </p:spPr>
+            <p:txBody>
+              <a:bodyPr wrap="square" rtlCol="0">
+                <a:spAutoFit/>
+              </a:bodyPr>
+              <a:lstStyle/>
+              <a:p>
+                <a14:m>
+                  <m:oMathPara xmlns:m="http://schemas.openxmlformats.org/officeDocument/2006/math">
+                    <m:oMathParaPr>
+                      <m:jc m:val="centerGroup"/>
+                    </m:oMathParaPr>
+                    <m:oMath xmlns:m="http://schemas.openxmlformats.org/officeDocument/2006/math">
+                      <m:r>
+                        <a:rPr lang="en-AU" b="0" i="1" smtClean="0">
+                          <a:latin typeface="Cambria Math" charset="0"/>
+                        </a:rPr>
+                        <m:t>𝑜</m:t>
+                      </m:r>
+                    </m:oMath>
+                  </m:oMathPara>
+                </a14:m>
+                <a:endParaRPr lang="en-US" dirty="0"/>
+              </a:p>
+            </p:txBody>
+          </p:sp>
+        </mc:Choice>
+        <mc:Fallback>
+          <p:sp>
+            <p:nvSpPr>
+              <p:cNvPr id="25" name="TextBox 24"/>
+              <p:cNvSpPr txBox="1">
+                <a:spLocks noRot="1" noChangeAspect="1" noMove="1" noResize="1" noEditPoints="1" noAdjustHandles="1" noChangeArrowheads="1" noChangeShapeType="1" noTextEdit="1"/>
+              </p:cNvSpPr>
+              <p:nvPr/>
+            </p:nvSpPr>
+            <p:spPr>
+              <a:xfrm>
+                <a:off x="8244408" y="1619508"/>
+                <a:ext cx="576064" cy="369332"/>
+              </a:xfrm>
+              <a:prstGeom prst="rect">
+                <a:avLst/>
+              </a:prstGeom>
+              <a:blipFill rotWithShape="0">
+                <a:blip r:embed="rId11"/>
+                <a:stretch>
+                  <a:fillRect/>
+                </a:stretch>
+              </a:blipFill>
+            </p:spPr>
+            <p:txBody>
+              <a:bodyPr/>
+              <a:lstStyle/>
+              <a:p>
+                <a:r>
+                  <a:rPr lang="en-US">
+                    <a:noFill/>
+                  </a:rPr>
+                  <a:t> </a:t>
+                </a:r>
+              </a:p>
+            </p:txBody>
+          </p:sp>
+        </mc:Fallback>
+      </mc:AlternateContent>
+    </p:spTree>
+    <p:extLst>
+      <p:ext uri="{BB962C8B-B14F-4D97-AF65-F5344CB8AC3E}">
+        <p14:creationId xmlns:p14="http://schemas.microsoft.com/office/powerpoint/2010/main" val="578201474"/>
+      </p:ext>
+    </p:extLst>
+  </p:cSld>
+  <p:clrMapOvr>
+    <a:masterClrMapping/>
+  </p:clrMapOvr>
+</p:sld>
+</file>
+
+<file path=ppt/slides/slide2.xml><?xml version="1.0" encoding="utf-8"?>
+<p:sld xmlns:a="http://schemas.openxmlformats.org/drawingml/2006/main" xmlns:r="http://schemas.openxmlformats.org/officeDocument/2006/relationships" xmlns:p="http://schemas.openxmlformats.org/presentationml/2006/main">
+  <p:cSld>
+    <p:spTree>
+      <p:nvGrpSpPr>
+        <p:cNvPr id="1" name=""/>
+        <p:cNvGrpSpPr/>
+        <p:nvPr/>
+      </p:nvGrpSpPr>
+      <p:grpSpPr>
+        <a:xfrm>
+          <a:off x="0" y="0"/>
+          <a:ext cx="0" cy="0"/>
+          <a:chOff x="0" y="0"/>
+          <a:chExt cx="0" cy="0"/>
+        </a:xfrm>
+      </p:grpSpPr>
+    </p:spTree>
+    <p:extLst>
+      <p:ext uri="{BB962C8B-B14F-4D97-AF65-F5344CB8AC3E}">
+        <p14:creationId xmlns:p14="http://schemas.microsoft.com/office/powerpoint/2010/main" val="593115402"/>
+      </p:ext>
+    </p:extLst>
+  </p:cSld>
+  <p:clrMapOvr>
+    <a:masterClrMapping/>
+  </p:clrMapOvr>
+</p:sld>
+</file>
+
+<file path=ppt/slides/slide3.xml><?xml version="1.0" encoding="utf-8"?>
 <p:sld xmlns:a="http://schemas.openxmlformats.org/drawingml/2006/main" xmlns:r="http://schemas.openxmlformats.org/officeDocument/2006/relationships" xmlns:p="http://schemas.openxmlformats.org/presentationml/2006/main">
   <p:cSld>
     <p:spTree>

</xml_diff>